<commit_message>
Updating slides through linear regression
</commit_message>
<xml_diff>
--- a/Presentation/model_slides.pptx
+++ b/Presentation/model_slides.pptx
@@ -3326,18 +3326,18 @@
       </p:grpSpPr>
       <p:sp>
         <p:nvSpPr>
-          <p:cNvPr id="2" name="Title 1">
-            <a:extLst>
-              <a:ext uri="{FF2B5EF4-FFF2-40B4-BE49-F238E27FC236}">
-                <a16:creationId xmlns:a16="http://schemas.microsoft.com/office/drawing/2014/main" id="{3EB15D79-4B7F-C031-D102-1B9FA3B56C9B}"/>
-              </a:ext>
-            </a:extLst>
-          </p:cNvPr>
-          <p:cNvSpPr>
-            <a:spLocks noGrp="1"/>
-          </p:cNvSpPr>
-          <p:nvPr>
-            <p:ph type="ctrTitle"/>
+          <p:cNvPr id="4" name="Title 3">
+            <a:extLst>
+              <a:ext uri="{FF2B5EF4-FFF2-40B4-BE49-F238E27FC236}">
+                <a16:creationId xmlns:a16="http://schemas.microsoft.com/office/drawing/2014/main" id="{3153C9EE-1E74-4AD2-2AA0-F0DFD8F8999C}"/>
+              </a:ext>
+            </a:extLst>
+          </p:cNvPr>
+          <p:cNvSpPr>
+            <a:spLocks noGrp="1"/>
+          </p:cNvSpPr>
+          <p:nvPr>
+            <p:ph type="title"/>
           </p:nvPr>
         </p:nvSpPr>
         <p:spPr/>
@@ -3345,32 +3345,10 @@
           <a:bodyPr/>
           <a:lstStyle/>
           <a:p>
-            <a:endParaRPr lang="en-US"/>
-          </a:p>
-        </p:txBody>
-      </p:sp>
-      <p:sp>
-        <p:nvSpPr>
-          <p:cNvPr id="3" name="Subtitle 2">
-            <a:extLst>
-              <a:ext uri="{FF2B5EF4-FFF2-40B4-BE49-F238E27FC236}">
-                <a16:creationId xmlns:a16="http://schemas.microsoft.com/office/drawing/2014/main" id="{9C4EC3AE-44BE-BF55-605B-B2BE32844CE0}"/>
-              </a:ext>
-            </a:extLst>
-          </p:cNvPr>
-          <p:cNvSpPr>
-            <a:spLocks noGrp="1"/>
-          </p:cNvSpPr>
-          <p:nvPr>
-            <p:ph type="subTitle" idx="1"/>
-          </p:nvPr>
-        </p:nvSpPr>
-        <p:spPr/>
-        <p:txBody>
-          <a:bodyPr/>
-          <a:lstStyle/>
-          <a:p>
-            <a:endParaRPr lang="en-US"/>
+            <a:r>
+              <a:rPr lang="en-US" dirty="0"/>
+              <a:t>Cookie Sales per Median Income</a:t>
+            </a:r>
           </a:p>
         </p:txBody>
       </p:sp>
@@ -3486,7 +3464,7 @@
           <a:p>
             <a:r>
               <a:rPr lang="en-US" sz="2700" dirty="0" err="1"/>
-              <a:t>Sklearn</a:t>
+              <a:t>sklearn</a:t>
             </a:r>
             <a:r>
               <a:rPr lang="en-US" sz="2700" dirty="0"/>
@@ -3511,11 +3489,19 @@
             <a:pPr marL="342900" lvl="1" indent="-342900"/>
             <a:r>
               <a:rPr lang="en-US" sz="2800" dirty="0" err="1"/>
+              <a:t>sklearn</a:t>
+            </a:r>
+            <a:r>
+              <a:rPr lang="en-US" sz="2800" dirty="0"/>
+              <a:t> </a:t>
+            </a:r>
+            <a:r>
+              <a:rPr lang="en-US" sz="2800" dirty="0" err="1"/>
               <a:t>LinearRegression</a:t>
             </a:r>
             <a:r>
               <a:rPr lang="en-US" sz="2800" dirty="0"/>
-              <a:t>() model</a:t>
+              <a:t>()</a:t>
             </a:r>
           </a:p>
           <a:p>
@@ -3593,6 +3579,418 @@
   <p:clrMapOvr>
     <a:masterClrMapping/>
   </p:clrMapOvr>
+  <p:timing>
+    <p:tnLst>
+      <p:par>
+        <p:cTn id="1" dur="indefinite" restart="never" nodeType="tmRoot">
+          <p:childTnLst>
+            <p:seq concurrent="1" nextAc="seek">
+              <p:cTn id="2" dur="indefinite" nodeType="mainSeq">
+                <p:childTnLst>
+                  <p:par>
+                    <p:cTn id="3" fill="hold">
+                      <p:stCondLst>
+                        <p:cond delay="indefinite"/>
+                      </p:stCondLst>
+                      <p:childTnLst>
+                        <p:par>
+                          <p:cTn id="4" fill="hold">
+                            <p:stCondLst>
+                              <p:cond delay="0"/>
+                            </p:stCondLst>
+                            <p:childTnLst>
+                              <p:par>
+                                <p:cTn id="5" presetID="1" presetClass="entr" presetSubtype="0" fill="hold" nodeType="clickEffect">
+                                  <p:stCondLst>
+                                    <p:cond delay="0"/>
+                                  </p:stCondLst>
+                                  <p:childTnLst>
+                                    <p:set>
+                                      <p:cBhvr>
+                                        <p:cTn id="6" dur="1" fill="hold">
+                                          <p:stCondLst>
+                                            <p:cond delay="0"/>
+                                          </p:stCondLst>
+                                        </p:cTn>
+                                        <p:tgtEl>
+                                          <p:spTgt spid="4">
+                                            <p:txEl>
+                                              <p:pRg st="0" end="0"/>
+                                            </p:txEl>
+                                          </p:spTgt>
+                                        </p:tgtEl>
+                                        <p:attrNameLst>
+                                          <p:attrName>style.visibility</p:attrName>
+                                        </p:attrNameLst>
+                                      </p:cBhvr>
+                                      <p:to>
+                                        <p:strVal val="visible"/>
+                                      </p:to>
+                                    </p:set>
+                                  </p:childTnLst>
+                                </p:cTn>
+                              </p:par>
+                              <p:par>
+                                <p:cTn id="7" presetID="1" presetClass="entr" presetSubtype="0" fill="hold" nodeType="withEffect">
+                                  <p:stCondLst>
+                                    <p:cond delay="0"/>
+                                  </p:stCondLst>
+                                  <p:childTnLst>
+                                    <p:set>
+                                      <p:cBhvr>
+                                        <p:cTn id="8" dur="1" fill="hold">
+                                          <p:stCondLst>
+                                            <p:cond delay="0"/>
+                                          </p:stCondLst>
+                                        </p:cTn>
+                                        <p:tgtEl>
+                                          <p:spTgt spid="4">
+                                            <p:txEl>
+                                              <p:pRg st="1" end="1"/>
+                                            </p:txEl>
+                                          </p:spTgt>
+                                        </p:tgtEl>
+                                        <p:attrNameLst>
+                                          <p:attrName>style.visibility</p:attrName>
+                                        </p:attrNameLst>
+                                      </p:cBhvr>
+                                      <p:to>
+                                        <p:strVal val="visible"/>
+                                      </p:to>
+                                    </p:set>
+                                  </p:childTnLst>
+                                </p:cTn>
+                              </p:par>
+                            </p:childTnLst>
+                          </p:cTn>
+                        </p:par>
+                      </p:childTnLst>
+                    </p:cTn>
+                  </p:par>
+                  <p:par>
+                    <p:cTn id="9" fill="hold">
+                      <p:stCondLst>
+                        <p:cond delay="indefinite"/>
+                      </p:stCondLst>
+                      <p:childTnLst>
+                        <p:par>
+                          <p:cTn id="10" fill="hold">
+                            <p:stCondLst>
+                              <p:cond delay="0"/>
+                            </p:stCondLst>
+                            <p:childTnLst>
+                              <p:par>
+                                <p:cTn id="11" presetID="1" presetClass="entr" presetSubtype="0" fill="hold" nodeType="clickEffect">
+                                  <p:stCondLst>
+                                    <p:cond delay="0"/>
+                                  </p:stCondLst>
+                                  <p:childTnLst>
+                                    <p:set>
+                                      <p:cBhvr>
+                                        <p:cTn id="12" dur="1" fill="hold">
+                                          <p:stCondLst>
+                                            <p:cond delay="0"/>
+                                          </p:stCondLst>
+                                        </p:cTn>
+                                        <p:tgtEl>
+                                          <p:spTgt spid="4">
+                                            <p:txEl>
+                                              <p:pRg st="2" end="2"/>
+                                            </p:txEl>
+                                          </p:spTgt>
+                                        </p:tgtEl>
+                                        <p:attrNameLst>
+                                          <p:attrName>style.visibility</p:attrName>
+                                        </p:attrNameLst>
+                                      </p:cBhvr>
+                                      <p:to>
+                                        <p:strVal val="visible"/>
+                                      </p:to>
+                                    </p:set>
+                                  </p:childTnLst>
+                                </p:cTn>
+                              </p:par>
+                              <p:par>
+                                <p:cTn id="13" presetID="1" presetClass="entr" presetSubtype="0" fill="hold" nodeType="withEffect">
+                                  <p:stCondLst>
+                                    <p:cond delay="0"/>
+                                  </p:stCondLst>
+                                  <p:childTnLst>
+                                    <p:set>
+                                      <p:cBhvr>
+                                        <p:cTn id="14" dur="1" fill="hold">
+                                          <p:stCondLst>
+                                            <p:cond delay="0"/>
+                                          </p:stCondLst>
+                                        </p:cTn>
+                                        <p:tgtEl>
+                                          <p:spTgt spid="4">
+                                            <p:txEl>
+                                              <p:pRg st="3" end="3"/>
+                                            </p:txEl>
+                                          </p:spTgt>
+                                        </p:tgtEl>
+                                        <p:attrNameLst>
+                                          <p:attrName>style.visibility</p:attrName>
+                                        </p:attrNameLst>
+                                      </p:cBhvr>
+                                      <p:to>
+                                        <p:strVal val="visible"/>
+                                      </p:to>
+                                    </p:set>
+                                  </p:childTnLst>
+                                </p:cTn>
+                              </p:par>
+                              <p:par>
+                                <p:cTn id="15" presetID="1" presetClass="entr" presetSubtype="0" fill="hold" nodeType="withEffect">
+                                  <p:stCondLst>
+                                    <p:cond delay="0"/>
+                                  </p:stCondLst>
+                                  <p:childTnLst>
+                                    <p:set>
+                                      <p:cBhvr>
+                                        <p:cTn id="16" dur="1" fill="hold">
+                                          <p:stCondLst>
+                                            <p:cond delay="0"/>
+                                          </p:stCondLst>
+                                        </p:cTn>
+                                        <p:tgtEl>
+                                          <p:spTgt spid="4">
+                                            <p:txEl>
+                                              <p:pRg st="4" end="4"/>
+                                            </p:txEl>
+                                          </p:spTgt>
+                                        </p:tgtEl>
+                                        <p:attrNameLst>
+                                          <p:attrName>style.visibility</p:attrName>
+                                        </p:attrNameLst>
+                                      </p:cBhvr>
+                                      <p:to>
+                                        <p:strVal val="visible"/>
+                                      </p:to>
+                                    </p:set>
+                                  </p:childTnLst>
+                                </p:cTn>
+                              </p:par>
+                            </p:childTnLst>
+                          </p:cTn>
+                        </p:par>
+                      </p:childTnLst>
+                    </p:cTn>
+                  </p:par>
+                  <p:par>
+                    <p:cTn id="17" fill="hold">
+                      <p:stCondLst>
+                        <p:cond delay="indefinite"/>
+                      </p:stCondLst>
+                      <p:childTnLst>
+                        <p:par>
+                          <p:cTn id="18" fill="hold">
+                            <p:stCondLst>
+                              <p:cond delay="0"/>
+                            </p:stCondLst>
+                            <p:childTnLst>
+                              <p:par>
+                                <p:cTn id="19" presetID="1" presetClass="entr" presetSubtype="0" fill="hold" nodeType="clickEffect">
+                                  <p:stCondLst>
+                                    <p:cond delay="0"/>
+                                  </p:stCondLst>
+                                  <p:childTnLst>
+                                    <p:set>
+                                      <p:cBhvr>
+                                        <p:cTn id="20" dur="1" fill="hold">
+                                          <p:stCondLst>
+                                            <p:cond delay="0"/>
+                                          </p:stCondLst>
+                                        </p:cTn>
+                                        <p:tgtEl>
+                                          <p:spTgt spid="4">
+                                            <p:txEl>
+                                              <p:pRg st="5" end="5"/>
+                                            </p:txEl>
+                                          </p:spTgt>
+                                        </p:tgtEl>
+                                        <p:attrNameLst>
+                                          <p:attrName>style.visibility</p:attrName>
+                                        </p:attrNameLst>
+                                      </p:cBhvr>
+                                      <p:to>
+                                        <p:strVal val="visible"/>
+                                      </p:to>
+                                    </p:set>
+                                  </p:childTnLst>
+                                </p:cTn>
+                              </p:par>
+                            </p:childTnLst>
+                          </p:cTn>
+                        </p:par>
+                      </p:childTnLst>
+                    </p:cTn>
+                  </p:par>
+                  <p:par>
+                    <p:cTn id="21" fill="hold">
+                      <p:stCondLst>
+                        <p:cond delay="indefinite"/>
+                      </p:stCondLst>
+                      <p:childTnLst>
+                        <p:par>
+                          <p:cTn id="22" fill="hold">
+                            <p:stCondLst>
+                              <p:cond delay="0"/>
+                            </p:stCondLst>
+                            <p:childTnLst>
+                              <p:par>
+                                <p:cTn id="23" presetID="1" presetClass="entr" presetSubtype="0" fill="hold" nodeType="clickEffect">
+                                  <p:stCondLst>
+                                    <p:cond delay="0"/>
+                                  </p:stCondLst>
+                                  <p:childTnLst>
+                                    <p:set>
+                                      <p:cBhvr>
+                                        <p:cTn id="24" dur="1" fill="hold">
+                                          <p:stCondLst>
+                                            <p:cond delay="0"/>
+                                          </p:stCondLst>
+                                        </p:cTn>
+                                        <p:tgtEl>
+                                          <p:spTgt spid="4">
+                                            <p:txEl>
+                                              <p:pRg st="6" end="6"/>
+                                            </p:txEl>
+                                          </p:spTgt>
+                                        </p:tgtEl>
+                                        <p:attrNameLst>
+                                          <p:attrName>style.visibility</p:attrName>
+                                        </p:attrNameLst>
+                                      </p:cBhvr>
+                                      <p:to>
+                                        <p:strVal val="visible"/>
+                                      </p:to>
+                                    </p:set>
+                                  </p:childTnLst>
+                                </p:cTn>
+                              </p:par>
+                              <p:par>
+                                <p:cTn id="25" presetID="1" presetClass="entr" presetSubtype="0" fill="hold" nodeType="withEffect">
+                                  <p:stCondLst>
+                                    <p:cond delay="0"/>
+                                  </p:stCondLst>
+                                  <p:childTnLst>
+                                    <p:set>
+                                      <p:cBhvr>
+                                        <p:cTn id="26" dur="1" fill="hold">
+                                          <p:stCondLst>
+                                            <p:cond delay="0"/>
+                                          </p:stCondLst>
+                                        </p:cTn>
+                                        <p:tgtEl>
+                                          <p:spTgt spid="4">
+                                            <p:txEl>
+                                              <p:pRg st="7" end="7"/>
+                                            </p:txEl>
+                                          </p:spTgt>
+                                        </p:tgtEl>
+                                        <p:attrNameLst>
+                                          <p:attrName>style.visibility</p:attrName>
+                                        </p:attrNameLst>
+                                      </p:cBhvr>
+                                      <p:to>
+                                        <p:strVal val="visible"/>
+                                      </p:to>
+                                    </p:set>
+                                  </p:childTnLst>
+                                </p:cTn>
+                              </p:par>
+                              <p:par>
+                                <p:cTn id="27" presetID="1" presetClass="entr" presetSubtype="0" fill="hold" nodeType="withEffect">
+                                  <p:stCondLst>
+                                    <p:cond delay="0"/>
+                                  </p:stCondLst>
+                                  <p:childTnLst>
+                                    <p:set>
+                                      <p:cBhvr>
+                                        <p:cTn id="28" dur="1" fill="hold">
+                                          <p:stCondLst>
+                                            <p:cond delay="0"/>
+                                          </p:stCondLst>
+                                        </p:cTn>
+                                        <p:tgtEl>
+                                          <p:spTgt spid="4">
+                                            <p:txEl>
+                                              <p:pRg st="8" end="8"/>
+                                            </p:txEl>
+                                          </p:spTgt>
+                                        </p:tgtEl>
+                                        <p:attrNameLst>
+                                          <p:attrName>style.visibility</p:attrName>
+                                        </p:attrNameLst>
+                                      </p:cBhvr>
+                                      <p:to>
+                                        <p:strVal val="visible"/>
+                                      </p:to>
+                                    </p:set>
+                                  </p:childTnLst>
+                                </p:cTn>
+                              </p:par>
+                              <p:par>
+                                <p:cTn id="29" presetID="1" presetClass="entr" presetSubtype="0" fill="hold" nodeType="withEffect">
+                                  <p:stCondLst>
+                                    <p:cond delay="0"/>
+                                  </p:stCondLst>
+                                  <p:childTnLst>
+                                    <p:set>
+                                      <p:cBhvr>
+                                        <p:cTn id="30" dur="1" fill="hold">
+                                          <p:stCondLst>
+                                            <p:cond delay="0"/>
+                                          </p:stCondLst>
+                                        </p:cTn>
+                                        <p:tgtEl>
+                                          <p:spTgt spid="4">
+                                            <p:txEl>
+                                              <p:pRg st="9" end="9"/>
+                                            </p:txEl>
+                                          </p:spTgt>
+                                        </p:tgtEl>
+                                        <p:attrNameLst>
+                                          <p:attrName>style.visibility</p:attrName>
+                                        </p:attrNameLst>
+                                      </p:cBhvr>
+                                      <p:to>
+                                        <p:strVal val="visible"/>
+                                      </p:to>
+                                    </p:set>
+                                  </p:childTnLst>
+                                </p:cTn>
+                              </p:par>
+                            </p:childTnLst>
+                          </p:cTn>
+                        </p:par>
+                      </p:childTnLst>
+                    </p:cTn>
+                  </p:par>
+                </p:childTnLst>
+              </p:cTn>
+              <p:prevCondLst>
+                <p:cond evt="onPrev" delay="0">
+                  <p:tgtEl>
+                    <p:sldTgt/>
+                  </p:tgtEl>
+                </p:cond>
+              </p:prevCondLst>
+              <p:nextCondLst>
+                <p:cond evt="onNext" delay="0">
+                  <p:tgtEl>
+                    <p:sldTgt/>
+                  </p:tgtEl>
+                </p:cond>
+              </p:nextCondLst>
+            </p:seq>
+          </p:childTnLst>
+        </p:cTn>
+      </p:par>
+    </p:tnLst>
+  </p:timing>
 </p:sld>
 </file>
 
@@ -4356,7 +4754,7 @@
             <p:ph idx="1"/>
           </p:nvPr>
         </p:nvSpPr>
-        <p:spPr>
+        <p:spPr bwMode="black">
           <a:xfrm>
             <a:off x="838200" y="1825625"/>
             <a:ext cx="5669604" cy="4351338"/>
@@ -4385,6 +4783,42 @@
           </a:p>
         </p:txBody>
       </p:sp>
+      <p:pic>
+        <p:nvPicPr>
+          <p:cNvPr id="6" name="Picture 5" descr="Chart, scatter chart&#10;&#10;Description automatically generated">
+            <a:extLst>
+              <a:ext uri="{FF2B5EF4-FFF2-40B4-BE49-F238E27FC236}">
+                <a16:creationId xmlns:a16="http://schemas.microsoft.com/office/drawing/2014/main" id="{DDCF791B-0F41-8085-FF11-CCAA8FDF561C}"/>
+              </a:ext>
+            </a:extLst>
+          </p:cNvPr>
+          <p:cNvPicPr>
+            <a:picLocks noChangeAspect="1"/>
+          </p:cNvPicPr>
+          <p:nvPr/>
+        </p:nvPicPr>
+        <p:blipFill>
+          <a:blip r:embed="rId2">
+            <a:extLst>
+              <a:ext uri="{28A0092B-C50C-407E-A947-70E740481C1C}">
+                <a14:useLocalDpi xmlns:a14="http://schemas.microsoft.com/office/drawing/2010/main" val="0"/>
+              </a:ext>
+            </a:extLst>
+          </a:blip>
+          <a:stretch>
+            <a:fillRect/>
+          </a:stretch>
+        </p:blipFill>
+        <p:spPr>
+          <a:xfrm>
+            <a:off x="6706286" y="1825625"/>
+            <a:ext cx="5485714" cy="3657143"/>
+          </a:xfrm>
+          <a:prstGeom prst="rect">
+            <a:avLst/>
+          </a:prstGeom>
+        </p:spPr>
+      </p:pic>
     </p:spTree>
     <p:extLst>
       <p:ext uri="{BB962C8B-B14F-4D97-AF65-F5344CB8AC3E}">
@@ -4395,6 +4829,186 @@
   <p:clrMapOvr>
     <a:masterClrMapping/>
   </p:clrMapOvr>
+  <p:timing>
+    <p:tnLst>
+      <p:par>
+        <p:cTn id="1" dur="indefinite" restart="never" nodeType="tmRoot">
+          <p:childTnLst>
+            <p:seq concurrent="1" nextAc="seek">
+              <p:cTn id="2" dur="indefinite" nodeType="mainSeq">
+                <p:childTnLst>
+                  <p:par>
+                    <p:cTn id="3" fill="hold">
+                      <p:stCondLst>
+                        <p:cond delay="indefinite"/>
+                      </p:stCondLst>
+                      <p:childTnLst>
+                        <p:par>
+                          <p:cTn id="4" fill="hold">
+                            <p:stCondLst>
+                              <p:cond delay="0"/>
+                            </p:stCondLst>
+                            <p:childTnLst>
+                              <p:par>
+                                <p:cTn id="5" presetID="1" presetClass="entr" presetSubtype="0" fill="hold" grpId="0" nodeType="clickEffect">
+                                  <p:stCondLst>
+                                    <p:cond delay="0"/>
+                                  </p:stCondLst>
+                                  <p:childTnLst>
+                                    <p:set>
+                                      <p:cBhvr>
+                                        <p:cTn id="6" dur="1" fill="hold">
+                                          <p:stCondLst>
+                                            <p:cond delay="0"/>
+                                          </p:stCondLst>
+                                        </p:cTn>
+                                        <p:tgtEl>
+                                          <p:spTgt spid="5">
+                                            <p:txEl>
+                                              <p:pRg st="0" end="0"/>
+                                            </p:txEl>
+                                          </p:spTgt>
+                                        </p:tgtEl>
+                                        <p:attrNameLst>
+                                          <p:attrName>style.visibility</p:attrName>
+                                        </p:attrNameLst>
+                                      </p:cBhvr>
+                                      <p:to>
+                                        <p:strVal val="visible"/>
+                                      </p:to>
+                                    </p:set>
+                                  </p:childTnLst>
+                                </p:cTn>
+                              </p:par>
+                            </p:childTnLst>
+                          </p:cTn>
+                        </p:par>
+                      </p:childTnLst>
+                    </p:cTn>
+                  </p:par>
+                  <p:par>
+                    <p:cTn id="7" fill="hold">
+                      <p:stCondLst>
+                        <p:cond delay="indefinite"/>
+                      </p:stCondLst>
+                      <p:childTnLst>
+                        <p:par>
+                          <p:cTn id="8" fill="hold">
+                            <p:stCondLst>
+                              <p:cond delay="0"/>
+                            </p:stCondLst>
+                            <p:childTnLst>
+                              <p:par>
+                                <p:cTn id="9" presetID="1" presetClass="entr" presetSubtype="0" fill="hold" grpId="0" nodeType="clickEffect">
+                                  <p:stCondLst>
+                                    <p:cond delay="0"/>
+                                  </p:stCondLst>
+                                  <p:childTnLst>
+                                    <p:set>
+                                      <p:cBhvr>
+                                        <p:cTn id="10" dur="1" fill="hold">
+                                          <p:stCondLst>
+                                            <p:cond delay="0"/>
+                                          </p:stCondLst>
+                                        </p:cTn>
+                                        <p:tgtEl>
+                                          <p:spTgt spid="5">
+                                            <p:txEl>
+                                              <p:pRg st="1" end="1"/>
+                                            </p:txEl>
+                                          </p:spTgt>
+                                        </p:tgtEl>
+                                        <p:attrNameLst>
+                                          <p:attrName>style.visibility</p:attrName>
+                                        </p:attrNameLst>
+                                      </p:cBhvr>
+                                      <p:to>
+                                        <p:strVal val="visible"/>
+                                      </p:to>
+                                    </p:set>
+                                  </p:childTnLst>
+                                </p:cTn>
+                              </p:par>
+                            </p:childTnLst>
+                          </p:cTn>
+                        </p:par>
+                      </p:childTnLst>
+                    </p:cTn>
+                  </p:par>
+                  <p:par>
+                    <p:cTn id="11" fill="hold">
+                      <p:stCondLst>
+                        <p:cond delay="indefinite"/>
+                      </p:stCondLst>
+                      <p:childTnLst>
+                        <p:par>
+                          <p:cTn id="12" fill="hold">
+                            <p:stCondLst>
+                              <p:cond delay="0"/>
+                            </p:stCondLst>
+                            <p:childTnLst>
+                              <p:par>
+                                <p:cTn id="13" presetID="1" presetClass="entr" presetSubtype="0" fill="hold" grpId="0" nodeType="clickEffect">
+                                  <p:stCondLst>
+                                    <p:cond delay="0"/>
+                                  </p:stCondLst>
+                                  <p:childTnLst>
+                                    <p:set>
+                                      <p:cBhvr>
+                                        <p:cTn id="14" dur="1" fill="hold">
+                                          <p:stCondLst>
+                                            <p:cond delay="0"/>
+                                          </p:stCondLst>
+                                        </p:cTn>
+                                        <p:tgtEl>
+                                          <p:spTgt spid="5">
+                                            <p:txEl>
+                                              <p:pRg st="2" end="2"/>
+                                            </p:txEl>
+                                          </p:spTgt>
+                                        </p:tgtEl>
+                                        <p:attrNameLst>
+                                          <p:attrName>style.visibility</p:attrName>
+                                        </p:attrNameLst>
+                                      </p:cBhvr>
+                                      <p:to>
+                                        <p:strVal val="visible"/>
+                                      </p:to>
+                                    </p:set>
+                                  </p:childTnLst>
+                                </p:cTn>
+                              </p:par>
+                            </p:childTnLst>
+                          </p:cTn>
+                        </p:par>
+                      </p:childTnLst>
+                    </p:cTn>
+                  </p:par>
+                </p:childTnLst>
+              </p:cTn>
+              <p:prevCondLst>
+                <p:cond evt="onPrev" delay="0">
+                  <p:tgtEl>
+                    <p:sldTgt/>
+                  </p:tgtEl>
+                </p:cond>
+              </p:prevCondLst>
+              <p:nextCondLst>
+                <p:cond evt="onNext" delay="0">
+                  <p:tgtEl>
+                    <p:sldTgt/>
+                  </p:tgtEl>
+                </p:cond>
+              </p:nextCondLst>
+            </p:seq>
+          </p:childTnLst>
+        </p:cTn>
+      </p:par>
+    </p:tnLst>
+    <p:bldLst>
+      <p:bldP spid="5" grpId="0" uiExpand="1" build="p"/>
+    </p:bldLst>
+  </p:timing>
 </p:sld>
 </file>
 

</xml_diff>

<commit_message>
Updating slides through logistic regression model conclusions
</commit_message>
<xml_diff>
--- a/Presentation/model_slides.pptx
+++ b/Presentation/model_slides.pptx
@@ -110,6 +110,11 @@
       </a:defRPr>
     </a:lvl9pPr>
   </p:defaultTextStyle>
+  <p:extLst>
+    <p:ext uri="{EFAFB233-063F-42B5-8137-9DF3F51BA10A}">
+      <p15:sldGuideLst xmlns:p15="http://schemas.microsoft.com/office/powerpoint/2012/main"/>
+    </p:ext>
+  </p:extLst>
 </p:presentation>
 </file>
 
@@ -260,7 +265,7 @@
           <a:p>
             <a:fld id="{1A80B725-277F-477A-968F-8107A1BDEAC6}" type="datetimeFigureOut">
               <a:rPr lang="en-US" smtClean="0"/>
-              <a:t>6/3/2022</a:t>
+              <a:t>6/4/2022</a:t>
             </a:fld>
             <a:endParaRPr lang="en-US"/>
           </a:p>
@@ -458,7 +463,7 @@
           <a:p>
             <a:fld id="{1A80B725-277F-477A-968F-8107A1BDEAC6}" type="datetimeFigureOut">
               <a:rPr lang="en-US" smtClean="0"/>
-              <a:t>6/3/2022</a:t>
+              <a:t>6/4/2022</a:t>
             </a:fld>
             <a:endParaRPr lang="en-US"/>
           </a:p>
@@ -666,7 +671,7 @@
           <a:p>
             <a:fld id="{1A80B725-277F-477A-968F-8107A1BDEAC6}" type="datetimeFigureOut">
               <a:rPr lang="en-US" smtClean="0"/>
-              <a:t>6/3/2022</a:t>
+              <a:t>6/4/2022</a:t>
             </a:fld>
             <a:endParaRPr lang="en-US"/>
           </a:p>
@@ -864,7 +869,7 @@
           <a:p>
             <a:fld id="{1A80B725-277F-477A-968F-8107A1BDEAC6}" type="datetimeFigureOut">
               <a:rPr lang="en-US" smtClean="0"/>
-              <a:t>6/3/2022</a:t>
+              <a:t>6/4/2022</a:t>
             </a:fld>
             <a:endParaRPr lang="en-US"/>
           </a:p>
@@ -1139,7 +1144,7 @@
           <a:p>
             <a:fld id="{1A80B725-277F-477A-968F-8107A1BDEAC6}" type="datetimeFigureOut">
               <a:rPr lang="en-US" smtClean="0"/>
-              <a:t>6/3/2022</a:t>
+              <a:t>6/4/2022</a:t>
             </a:fld>
             <a:endParaRPr lang="en-US"/>
           </a:p>
@@ -1404,7 +1409,7 @@
           <a:p>
             <a:fld id="{1A80B725-277F-477A-968F-8107A1BDEAC6}" type="datetimeFigureOut">
               <a:rPr lang="en-US" smtClean="0"/>
-              <a:t>6/3/2022</a:t>
+              <a:t>6/4/2022</a:t>
             </a:fld>
             <a:endParaRPr lang="en-US"/>
           </a:p>
@@ -1816,7 +1821,7 @@
           <a:p>
             <a:fld id="{1A80B725-277F-477A-968F-8107A1BDEAC6}" type="datetimeFigureOut">
               <a:rPr lang="en-US" smtClean="0"/>
-              <a:t>6/3/2022</a:t>
+              <a:t>6/4/2022</a:t>
             </a:fld>
             <a:endParaRPr lang="en-US"/>
           </a:p>
@@ -1957,7 +1962,7 @@
           <a:p>
             <a:fld id="{1A80B725-277F-477A-968F-8107A1BDEAC6}" type="datetimeFigureOut">
               <a:rPr lang="en-US" smtClean="0"/>
-              <a:t>6/3/2022</a:t>
+              <a:t>6/4/2022</a:t>
             </a:fld>
             <a:endParaRPr lang="en-US"/>
           </a:p>
@@ -2070,7 +2075,7 @@
           <a:p>
             <a:fld id="{1A80B725-277F-477A-968F-8107A1BDEAC6}" type="datetimeFigureOut">
               <a:rPr lang="en-US" smtClean="0"/>
-              <a:t>6/3/2022</a:t>
+              <a:t>6/4/2022</a:t>
             </a:fld>
             <a:endParaRPr lang="en-US"/>
           </a:p>
@@ -2381,7 +2386,7 @@
           <a:p>
             <a:fld id="{1A80B725-277F-477A-968F-8107A1BDEAC6}" type="datetimeFigureOut">
               <a:rPr lang="en-US" smtClean="0"/>
-              <a:t>6/3/2022</a:t>
+              <a:t>6/4/2022</a:t>
             </a:fld>
             <a:endParaRPr lang="en-US"/>
           </a:p>
@@ -2669,7 +2674,7 @@
           <a:p>
             <a:fld id="{1A80B725-277F-477A-968F-8107A1BDEAC6}" type="datetimeFigureOut">
               <a:rPr lang="en-US" smtClean="0"/>
-              <a:t>6/3/2022</a:t>
+              <a:t>6/4/2022</a:t>
             </a:fld>
             <a:endParaRPr lang="en-US"/>
           </a:p>
@@ -2910,7 +2915,7 @@
           <a:p>
             <a:fld id="{1A80B725-277F-477A-968F-8107A1BDEAC6}" type="datetimeFigureOut">
               <a:rPr lang="en-US" smtClean="0"/>
-              <a:t>6/3/2022</a:t>
+              <a:t>6/4/2022</a:t>
             </a:fld>
             <a:endParaRPr lang="en-US"/>
           </a:p>
@@ -4313,7 +4318,7 @@
         </p:nvSpPr>
         <p:spPr>
           <a:xfrm>
-            <a:off x="330630" y="1848465"/>
+            <a:off x="221850" y="1825333"/>
             <a:ext cx="1232699" cy="373625"/>
           </a:xfrm>
           <a:prstGeom prst="rect">
@@ -4348,7 +4353,7 @@
         </p:nvSpPr>
         <p:spPr>
           <a:xfrm>
-            <a:off x="6205405" y="1882878"/>
+            <a:off x="6096000" y="1882956"/>
             <a:ext cx="1385099" cy="369332"/>
           </a:xfrm>
           <a:prstGeom prst="rect">
@@ -5009,6 +5014,45 @@
           </a:prstGeom>
         </p:spPr>
       </p:pic>
+      <p:sp>
+        <p:nvSpPr>
+          <p:cNvPr id="3" name="TextBox 2">
+            <a:extLst>
+              <a:ext uri="{FF2B5EF4-FFF2-40B4-BE49-F238E27FC236}">
+                <a16:creationId xmlns:a16="http://schemas.microsoft.com/office/drawing/2014/main" id="{764FD4AB-B596-EDD9-588A-7472A8217084}"/>
+              </a:ext>
+            </a:extLst>
+          </p:cNvPr>
+          <p:cNvSpPr txBox="1"/>
+          <p:nvPr/>
+        </p:nvSpPr>
+        <p:spPr>
+          <a:xfrm>
+            <a:off x="9737388" y="2616740"/>
+            <a:ext cx="1945532" cy="369332"/>
+          </a:xfrm>
+          <a:prstGeom prst="rect">
+            <a:avLst/>
+          </a:prstGeom>
+          <a:noFill/>
+        </p:spPr>
+        <p:txBody>
+          <a:bodyPr wrap="square" rtlCol="0">
+            <a:spAutoFit/>
+          </a:bodyPr>
+          <a:lstStyle/>
+          <a:p>
+            <a:r>
+              <a:rPr lang="en-US" dirty="0">
+                <a:solidFill>
+                  <a:srgbClr val="FF0000"/>
+                </a:solidFill>
+              </a:rPr>
+              <a:t>y = 8.1e-06x + 5.61  </a:t>
+            </a:r>
+          </a:p>
+        </p:txBody>
+      </p:sp>
     </p:spTree>
     <p:extLst>
       <p:ext uri="{BB962C8B-B14F-4D97-AF65-F5344CB8AC3E}">
@@ -5247,12 +5291,46 @@
           </a:p>
         </p:txBody>
       </p:sp>
-      <p:sp>
-        <p:nvSpPr>
-          <p:cNvPr id="5" name="Content Placeholder 4">
-            <a:extLst>
-              <a:ext uri="{FF2B5EF4-FFF2-40B4-BE49-F238E27FC236}">
-                <a16:creationId xmlns:a16="http://schemas.microsoft.com/office/drawing/2014/main" id="{C9B57714-93D3-ACE1-7E33-D988F470958D}"/>
+      <p:pic>
+        <p:nvPicPr>
+          <p:cNvPr id="3" name="Content Placeholder 2" descr="Graphical user interface, text, application, email&#10;&#10;Description automatically generated">
+            <a:extLst>
+              <a:ext uri="{FF2B5EF4-FFF2-40B4-BE49-F238E27FC236}">
+                <a16:creationId xmlns:a16="http://schemas.microsoft.com/office/drawing/2014/main" id="{C9FAA66A-76B7-D822-1E8A-6F954C87E9F3}"/>
+              </a:ext>
+            </a:extLst>
+          </p:cNvPr>
+          <p:cNvPicPr>
+            <a:picLocks noGrp="1" noChangeAspect="1"/>
+          </p:cNvPicPr>
+          <p:nvPr>
+            <p:ph sz="half" idx="2"/>
+          </p:nvPr>
+        </p:nvPicPr>
+        <p:blipFill rotWithShape="1">
+          <a:blip r:embed="rId2">
+            <a:extLst>
+              <a:ext uri="{28A0092B-C50C-407E-A947-70E740481C1C}">
+                <a14:useLocalDpi xmlns:a14="http://schemas.microsoft.com/office/drawing/2010/main" val="0"/>
+              </a:ext>
+            </a:extLst>
+          </a:blip>
+          <a:srcRect r="38472"/>
+          <a:stretch/>
+        </p:blipFill>
+        <p:spPr>
+          <a:xfrm>
+            <a:off x="6096000" y="2023628"/>
+            <a:ext cx="5715000" cy="3628973"/>
+          </a:xfrm>
+        </p:spPr>
+      </p:pic>
+      <p:sp>
+        <p:nvSpPr>
+          <p:cNvPr id="7" name="Content Placeholder 3">
+            <a:extLst>
+              <a:ext uri="{FF2B5EF4-FFF2-40B4-BE49-F238E27FC236}">
+                <a16:creationId xmlns:a16="http://schemas.microsoft.com/office/drawing/2014/main" id="{AEC38657-B487-416A-13F4-539C4039F641}"/>
               </a:ext>
             </a:extLst>
           </p:cNvPr>
@@ -5263,37 +5341,154 @@
             <p:ph sz="half" idx="1"/>
           </p:nvPr>
         </p:nvSpPr>
-        <p:spPr/>
-        <p:txBody>
-          <a:bodyPr/>
+        <p:spPr>
+          <a:xfrm>
+            <a:off x="719847" y="1825624"/>
+            <a:ext cx="5452353" cy="4507081"/>
+          </a:xfrm>
+        </p:spPr>
+        <p:txBody>
+          <a:bodyPr>
+            <a:normAutofit fontScale="92500" lnSpcReduction="20000"/>
+          </a:bodyPr>
           <a:lstStyle/>
           <a:p>
-            <a:endParaRPr lang="en-US"/>
-          </a:p>
-        </p:txBody>
-      </p:sp>
-      <p:sp>
-        <p:nvSpPr>
-          <p:cNvPr id="6" name="Content Placeholder 5">
-            <a:extLst>
-              <a:ext uri="{FF2B5EF4-FFF2-40B4-BE49-F238E27FC236}">
-                <a16:creationId xmlns:a16="http://schemas.microsoft.com/office/drawing/2014/main" id="{E5FD5214-8D39-9454-E202-BA80B03D1F7B}"/>
-              </a:ext>
-            </a:extLst>
-          </p:cNvPr>
-          <p:cNvSpPr>
-            <a:spLocks noGrp="1"/>
-          </p:cNvSpPr>
-          <p:nvPr>
-            <p:ph sz="half" idx="2"/>
-          </p:nvPr>
-        </p:nvSpPr>
-        <p:spPr/>
-        <p:txBody>
-          <a:bodyPr/>
-          <a:lstStyle/>
-          <a:p>
-            <a:endParaRPr lang="en-US"/>
+            <a:pPr>
+              <a:lnSpc>
+                <a:spcPct val="100000"/>
+              </a:lnSpc>
+              <a:spcBef>
+                <a:spcPts val="0"/>
+              </a:spcBef>
+            </a:pPr>
+            <a:r>
+              <a:rPr lang="en-US" dirty="0"/>
+              <a:t>X = all cookie columns in </a:t>
+            </a:r>
+            <a:r>
+              <a:rPr lang="en-US" dirty="0" err="1"/>
+              <a:t>df</a:t>
+            </a:r>
+            <a:endParaRPr lang="en-US" dirty="0"/>
+          </a:p>
+          <a:p>
+            <a:pPr marL="233363" indent="0">
+              <a:lnSpc>
+                <a:spcPct val="100000"/>
+              </a:lnSpc>
+              <a:spcBef>
+                <a:spcPts val="0"/>
+              </a:spcBef>
+              <a:buNone/>
+            </a:pPr>
+            <a:r>
+              <a:rPr lang="en-US" dirty="0"/>
+              <a:t>y = </a:t>
+            </a:r>
+            <a:r>
+              <a:rPr lang="en-US" dirty="0" err="1"/>
+              <a:t>high_low_income</a:t>
+            </a:r>
+            <a:endParaRPr lang="en-US" dirty="0"/>
+          </a:p>
+          <a:p>
+            <a:r>
+              <a:rPr lang="en-US" sz="2700" dirty="0" err="1"/>
+              <a:t>sklearn</a:t>
+            </a:r>
+            <a:r>
+              <a:rPr lang="en-US" sz="2700" dirty="0"/>
+              <a:t> train-test-split (80%, 20%)</a:t>
+            </a:r>
+          </a:p>
+          <a:p>
+            <a:pPr lvl="1"/>
+            <a:r>
+              <a:rPr lang="en-US" dirty="0"/>
+              <a:t>Raw data</a:t>
+            </a:r>
+          </a:p>
+          <a:p>
+            <a:pPr lvl="1"/>
+            <a:r>
+              <a:rPr lang="en-US" dirty="0"/>
+              <a:t>Scaled data</a:t>
+            </a:r>
+          </a:p>
+          <a:p>
+            <a:pPr lvl="1"/>
+            <a:r>
+              <a:rPr lang="en-US" dirty="0"/>
+              <a:t>SMOTEENN</a:t>
+            </a:r>
+          </a:p>
+          <a:p>
+            <a:pPr lvl="1"/>
+            <a:r>
+              <a:rPr lang="en-US" dirty="0"/>
+              <a:t>SMOTE</a:t>
+            </a:r>
+          </a:p>
+          <a:p>
+            <a:pPr marL="342900" lvl="1" indent="-342900"/>
+            <a:r>
+              <a:rPr lang="en-US" sz="2800" dirty="0" err="1"/>
+              <a:t>sklearn</a:t>
+            </a:r>
+            <a:r>
+              <a:rPr lang="en-US" sz="2800" dirty="0"/>
+              <a:t> </a:t>
+            </a:r>
+            <a:r>
+              <a:rPr lang="en-US" sz="2800" dirty="0" err="1"/>
+              <a:t>LogisticRegression</a:t>
+            </a:r>
+            <a:r>
+              <a:rPr lang="en-US" sz="2800" dirty="0"/>
+              <a:t>()</a:t>
+            </a:r>
+          </a:p>
+          <a:p>
+            <a:pPr marL="342900" lvl="1" indent="-342900">
+              <a:spcBef>
+                <a:spcPts val="1200"/>
+              </a:spcBef>
+            </a:pPr>
+            <a:r>
+              <a:rPr lang="en-US" sz="2800" dirty="0"/>
+              <a:t>Calculations</a:t>
+            </a:r>
+          </a:p>
+          <a:p>
+            <a:pPr marL="800100" lvl="2" indent="-342900"/>
+            <a:r>
+              <a:rPr lang="en-US" sz="2400" dirty="0"/>
+              <a:t>Accuracy/Balanced accuracy score</a:t>
+            </a:r>
+          </a:p>
+          <a:p>
+            <a:pPr marL="800100" lvl="2" indent="-342900"/>
+            <a:r>
+              <a:rPr lang="en-US" sz="2400" dirty="0"/>
+              <a:t>Confusion matrix</a:t>
+            </a:r>
+          </a:p>
+          <a:p>
+            <a:pPr marL="800100" lvl="2" indent="-342900"/>
+            <a:r>
+              <a:rPr lang="en-US" sz="2400" dirty="0"/>
+              <a:t>Classification report/Imbalanced classification report</a:t>
+            </a:r>
+            <a:endParaRPr lang="en-US" dirty="0"/>
+          </a:p>
+          <a:p>
+            <a:pPr marL="0" indent="0">
+              <a:buNone/>
+            </a:pPr>
+            <a:endParaRPr lang="en-US" dirty="0"/>
+          </a:p>
+          <a:p>
+            <a:endParaRPr lang="en-US" dirty="0"/>
           </a:p>
         </p:txBody>
       </p:sp>
@@ -5307,6 +5502,480 @@
   <p:clrMapOvr>
     <a:masterClrMapping/>
   </p:clrMapOvr>
+  <p:timing>
+    <p:tnLst>
+      <p:par>
+        <p:cTn id="1" dur="indefinite" restart="never" nodeType="tmRoot">
+          <p:childTnLst>
+            <p:seq concurrent="1" nextAc="seek">
+              <p:cTn id="2" dur="indefinite" nodeType="mainSeq">
+                <p:childTnLst>
+                  <p:par>
+                    <p:cTn id="3" fill="hold">
+                      <p:stCondLst>
+                        <p:cond delay="indefinite"/>
+                      </p:stCondLst>
+                      <p:childTnLst>
+                        <p:par>
+                          <p:cTn id="4" fill="hold">
+                            <p:stCondLst>
+                              <p:cond delay="0"/>
+                            </p:stCondLst>
+                            <p:childTnLst>
+                              <p:par>
+                                <p:cTn id="5" presetID="1" presetClass="entr" presetSubtype="0" fill="hold" nodeType="clickEffect">
+                                  <p:stCondLst>
+                                    <p:cond delay="0"/>
+                                  </p:stCondLst>
+                                  <p:childTnLst>
+                                    <p:set>
+                                      <p:cBhvr>
+                                        <p:cTn id="6" dur="1" fill="hold">
+                                          <p:stCondLst>
+                                            <p:cond delay="0"/>
+                                          </p:stCondLst>
+                                        </p:cTn>
+                                        <p:tgtEl>
+                                          <p:spTgt spid="7">
+                                            <p:txEl>
+                                              <p:pRg st="0" end="0"/>
+                                            </p:txEl>
+                                          </p:spTgt>
+                                        </p:tgtEl>
+                                        <p:attrNameLst>
+                                          <p:attrName>style.visibility</p:attrName>
+                                        </p:attrNameLst>
+                                      </p:cBhvr>
+                                      <p:to>
+                                        <p:strVal val="visible"/>
+                                      </p:to>
+                                    </p:set>
+                                  </p:childTnLst>
+                                </p:cTn>
+                              </p:par>
+                              <p:par>
+                                <p:cTn id="7" presetID="1" presetClass="entr" presetSubtype="0" fill="hold" nodeType="withEffect">
+                                  <p:stCondLst>
+                                    <p:cond delay="0"/>
+                                  </p:stCondLst>
+                                  <p:childTnLst>
+                                    <p:set>
+                                      <p:cBhvr>
+                                        <p:cTn id="8" dur="1" fill="hold">
+                                          <p:stCondLst>
+                                            <p:cond delay="0"/>
+                                          </p:stCondLst>
+                                        </p:cTn>
+                                        <p:tgtEl>
+                                          <p:spTgt spid="7">
+                                            <p:txEl>
+                                              <p:pRg st="1" end="1"/>
+                                            </p:txEl>
+                                          </p:spTgt>
+                                        </p:tgtEl>
+                                        <p:attrNameLst>
+                                          <p:attrName>style.visibility</p:attrName>
+                                        </p:attrNameLst>
+                                      </p:cBhvr>
+                                      <p:to>
+                                        <p:strVal val="visible"/>
+                                      </p:to>
+                                    </p:set>
+                                  </p:childTnLst>
+                                </p:cTn>
+                              </p:par>
+                            </p:childTnLst>
+                          </p:cTn>
+                        </p:par>
+                      </p:childTnLst>
+                    </p:cTn>
+                  </p:par>
+                  <p:par>
+                    <p:cTn id="9" fill="hold">
+                      <p:stCondLst>
+                        <p:cond delay="indefinite"/>
+                      </p:stCondLst>
+                      <p:childTnLst>
+                        <p:par>
+                          <p:cTn id="10" fill="hold">
+                            <p:stCondLst>
+                              <p:cond delay="0"/>
+                            </p:stCondLst>
+                            <p:childTnLst>
+                              <p:par>
+                                <p:cTn id="11" presetID="1" presetClass="entr" presetSubtype="0" fill="hold" nodeType="clickEffect">
+                                  <p:stCondLst>
+                                    <p:cond delay="0"/>
+                                  </p:stCondLst>
+                                  <p:childTnLst>
+                                    <p:set>
+                                      <p:cBhvr>
+                                        <p:cTn id="12" dur="1" fill="hold">
+                                          <p:stCondLst>
+                                            <p:cond delay="0"/>
+                                          </p:stCondLst>
+                                        </p:cTn>
+                                        <p:tgtEl>
+                                          <p:spTgt spid="7">
+                                            <p:txEl>
+                                              <p:pRg st="2" end="2"/>
+                                            </p:txEl>
+                                          </p:spTgt>
+                                        </p:tgtEl>
+                                        <p:attrNameLst>
+                                          <p:attrName>style.visibility</p:attrName>
+                                        </p:attrNameLst>
+                                      </p:cBhvr>
+                                      <p:to>
+                                        <p:strVal val="visible"/>
+                                      </p:to>
+                                    </p:set>
+                                  </p:childTnLst>
+                                </p:cTn>
+                              </p:par>
+                              <p:par>
+                                <p:cTn id="13" presetID="1" presetClass="entr" presetSubtype="0" fill="hold" nodeType="withEffect">
+                                  <p:stCondLst>
+                                    <p:cond delay="0"/>
+                                  </p:stCondLst>
+                                  <p:childTnLst>
+                                    <p:set>
+                                      <p:cBhvr>
+                                        <p:cTn id="14" dur="1" fill="hold">
+                                          <p:stCondLst>
+                                            <p:cond delay="0"/>
+                                          </p:stCondLst>
+                                        </p:cTn>
+                                        <p:tgtEl>
+                                          <p:spTgt spid="7">
+                                            <p:txEl>
+                                              <p:pRg st="3" end="3"/>
+                                            </p:txEl>
+                                          </p:spTgt>
+                                        </p:tgtEl>
+                                        <p:attrNameLst>
+                                          <p:attrName>style.visibility</p:attrName>
+                                        </p:attrNameLst>
+                                      </p:cBhvr>
+                                      <p:to>
+                                        <p:strVal val="visible"/>
+                                      </p:to>
+                                    </p:set>
+                                  </p:childTnLst>
+                                </p:cTn>
+                              </p:par>
+                              <p:par>
+                                <p:cTn id="15" presetID="1" presetClass="entr" presetSubtype="0" fill="hold" nodeType="withEffect">
+                                  <p:stCondLst>
+                                    <p:cond delay="0"/>
+                                  </p:stCondLst>
+                                  <p:childTnLst>
+                                    <p:set>
+                                      <p:cBhvr>
+                                        <p:cTn id="16" dur="1" fill="hold">
+                                          <p:stCondLst>
+                                            <p:cond delay="0"/>
+                                          </p:stCondLst>
+                                        </p:cTn>
+                                        <p:tgtEl>
+                                          <p:spTgt spid="7">
+                                            <p:txEl>
+                                              <p:pRg st="4" end="4"/>
+                                            </p:txEl>
+                                          </p:spTgt>
+                                        </p:tgtEl>
+                                        <p:attrNameLst>
+                                          <p:attrName>style.visibility</p:attrName>
+                                        </p:attrNameLst>
+                                      </p:cBhvr>
+                                      <p:to>
+                                        <p:strVal val="visible"/>
+                                      </p:to>
+                                    </p:set>
+                                  </p:childTnLst>
+                                </p:cTn>
+                              </p:par>
+                              <p:par>
+                                <p:cTn id="17" presetID="1" presetClass="entr" presetSubtype="0" fill="hold" nodeType="withEffect">
+                                  <p:stCondLst>
+                                    <p:cond delay="0"/>
+                                  </p:stCondLst>
+                                  <p:childTnLst>
+                                    <p:set>
+                                      <p:cBhvr>
+                                        <p:cTn id="18" dur="1" fill="hold">
+                                          <p:stCondLst>
+                                            <p:cond delay="0"/>
+                                          </p:stCondLst>
+                                        </p:cTn>
+                                        <p:tgtEl>
+                                          <p:spTgt spid="7">
+                                            <p:txEl>
+                                              <p:pRg st="5" end="5"/>
+                                            </p:txEl>
+                                          </p:spTgt>
+                                        </p:tgtEl>
+                                        <p:attrNameLst>
+                                          <p:attrName>style.visibility</p:attrName>
+                                        </p:attrNameLst>
+                                      </p:cBhvr>
+                                      <p:to>
+                                        <p:strVal val="visible"/>
+                                      </p:to>
+                                    </p:set>
+                                  </p:childTnLst>
+                                </p:cTn>
+                              </p:par>
+                              <p:par>
+                                <p:cTn id="19" presetID="1" presetClass="entr" presetSubtype="0" fill="hold" nodeType="withEffect">
+                                  <p:stCondLst>
+                                    <p:cond delay="0"/>
+                                  </p:stCondLst>
+                                  <p:childTnLst>
+                                    <p:set>
+                                      <p:cBhvr>
+                                        <p:cTn id="20" dur="1" fill="hold">
+                                          <p:stCondLst>
+                                            <p:cond delay="0"/>
+                                          </p:stCondLst>
+                                        </p:cTn>
+                                        <p:tgtEl>
+                                          <p:spTgt spid="7">
+                                            <p:txEl>
+                                              <p:pRg st="6" end="6"/>
+                                            </p:txEl>
+                                          </p:spTgt>
+                                        </p:tgtEl>
+                                        <p:attrNameLst>
+                                          <p:attrName>style.visibility</p:attrName>
+                                        </p:attrNameLst>
+                                      </p:cBhvr>
+                                      <p:to>
+                                        <p:strVal val="visible"/>
+                                      </p:to>
+                                    </p:set>
+                                  </p:childTnLst>
+                                </p:cTn>
+                              </p:par>
+                            </p:childTnLst>
+                          </p:cTn>
+                        </p:par>
+                      </p:childTnLst>
+                    </p:cTn>
+                  </p:par>
+                  <p:par>
+                    <p:cTn id="21" fill="hold">
+                      <p:stCondLst>
+                        <p:cond delay="indefinite"/>
+                      </p:stCondLst>
+                      <p:childTnLst>
+                        <p:par>
+                          <p:cTn id="22" fill="hold">
+                            <p:stCondLst>
+                              <p:cond delay="0"/>
+                            </p:stCondLst>
+                            <p:childTnLst>
+                              <p:par>
+                                <p:cTn id="23" presetID="1" presetClass="entr" presetSubtype="0" fill="hold" nodeType="clickEffect">
+                                  <p:stCondLst>
+                                    <p:cond delay="0"/>
+                                  </p:stCondLst>
+                                  <p:childTnLst>
+                                    <p:set>
+                                      <p:cBhvr>
+                                        <p:cTn id="24" dur="1" fill="hold">
+                                          <p:stCondLst>
+                                            <p:cond delay="0"/>
+                                          </p:stCondLst>
+                                        </p:cTn>
+                                        <p:tgtEl>
+                                          <p:spTgt spid="7">
+                                            <p:txEl>
+                                              <p:pRg st="7" end="7"/>
+                                            </p:txEl>
+                                          </p:spTgt>
+                                        </p:tgtEl>
+                                        <p:attrNameLst>
+                                          <p:attrName>style.visibility</p:attrName>
+                                        </p:attrNameLst>
+                                      </p:cBhvr>
+                                      <p:to>
+                                        <p:strVal val="visible"/>
+                                      </p:to>
+                                    </p:set>
+                                  </p:childTnLst>
+                                </p:cTn>
+                              </p:par>
+                            </p:childTnLst>
+                          </p:cTn>
+                        </p:par>
+                      </p:childTnLst>
+                    </p:cTn>
+                  </p:par>
+                  <p:par>
+                    <p:cTn id="25" fill="hold">
+                      <p:stCondLst>
+                        <p:cond delay="indefinite"/>
+                      </p:stCondLst>
+                      <p:childTnLst>
+                        <p:par>
+                          <p:cTn id="26" fill="hold">
+                            <p:stCondLst>
+                              <p:cond delay="0"/>
+                            </p:stCondLst>
+                            <p:childTnLst>
+                              <p:par>
+                                <p:cTn id="27" presetID="1" presetClass="entr" presetSubtype="0" fill="hold" nodeType="clickEffect">
+                                  <p:stCondLst>
+                                    <p:cond delay="0"/>
+                                  </p:stCondLst>
+                                  <p:childTnLst>
+                                    <p:set>
+                                      <p:cBhvr>
+                                        <p:cTn id="28" dur="1" fill="hold">
+                                          <p:stCondLst>
+                                            <p:cond delay="0"/>
+                                          </p:stCondLst>
+                                        </p:cTn>
+                                        <p:tgtEl>
+                                          <p:spTgt spid="7">
+                                            <p:txEl>
+                                              <p:pRg st="8" end="8"/>
+                                            </p:txEl>
+                                          </p:spTgt>
+                                        </p:tgtEl>
+                                        <p:attrNameLst>
+                                          <p:attrName>style.visibility</p:attrName>
+                                        </p:attrNameLst>
+                                      </p:cBhvr>
+                                      <p:to>
+                                        <p:strVal val="visible"/>
+                                      </p:to>
+                                    </p:set>
+                                  </p:childTnLst>
+                                </p:cTn>
+                              </p:par>
+                              <p:par>
+                                <p:cTn id="29" presetID="1" presetClass="entr" presetSubtype="0" fill="hold" nodeType="withEffect">
+                                  <p:stCondLst>
+                                    <p:cond delay="0"/>
+                                  </p:stCondLst>
+                                  <p:childTnLst>
+                                    <p:set>
+                                      <p:cBhvr>
+                                        <p:cTn id="30" dur="1" fill="hold">
+                                          <p:stCondLst>
+                                            <p:cond delay="0"/>
+                                          </p:stCondLst>
+                                        </p:cTn>
+                                        <p:tgtEl>
+                                          <p:spTgt spid="7">
+                                            <p:txEl>
+                                              <p:pRg st="9" end="9"/>
+                                            </p:txEl>
+                                          </p:spTgt>
+                                        </p:tgtEl>
+                                        <p:attrNameLst>
+                                          <p:attrName>style.visibility</p:attrName>
+                                        </p:attrNameLst>
+                                      </p:cBhvr>
+                                      <p:to>
+                                        <p:strVal val="visible"/>
+                                      </p:to>
+                                    </p:set>
+                                  </p:childTnLst>
+                                </p:cTn>
+                              </p:par>
+                              <p:par>
+                                <p:cTn id="31" presetID="1" presetClass="entr" presetSubtype="0" fill="hold" nodeType="withEffect">
+                                  <p:stCondLst>
+                                    <p:cond delay="0"/>
+                                  </p:stCondLst>
+                                  <p:childTnLst>
+                                    <p:set>
+                                      <p:cBhvr>
+                                        <p:cTn id="32" dur="1" fill="hold">
+                                          <p:stCondLst>
+                                            <p:cond delay="0"/>
+                                          </p:stCondLst>
+                                        </p:cTn>
+                                        <p:tgtEl>
+                                          <p:spTgt spid="7">
+                                            <p:txEl>
+                                              <p:pRg st="10" end="10"/>
+                                            </p:txEl>
+                                          </p:spTgt>
+                                        </p:tgtEl>
+                                        <p:attrNameLst>
+                                          <p:attrName>style.visibility</p:attrName>
+                                        </p:attrNameLst>
+                                      </p:cBhvr>
+                                      <p:to>
+                                        <p:strVal val="visible"/>
+                                      </p:to>
+                                    </p:set>
+                                  </p:childTnLst>
+                                </p:cTn>
+                              </p:par>
+                              <p:par>
+                                <p:cTn id="33" presetID="1" presetClass="entr" presetSubtype="0" fill="hold" nodeType="withEffect">
+                                  <p:stCondLst>
+                                    <p:cond delay="0"/>
+                                  </p:stCondLst>
+                                  <p:childTnLst>
+                                    <p:set>
+                                      <p:cBhvr>
+                                        <p:cTn id="34" dur="1" fill="hold">
+                                          <p:stCondLst>
+                                            <p:cond delay="0"/>
+                                          </p:stCondLst>
+                                        </p:cTn>
+                                        <p:tgtEl>
+                                          <p:spTgt spid="7">
+                                            <p:txEl>
+                                              <p:pRg st="11" end="11"/>
+                                            </p:txEl>
+                                          </p:spTgt>
+                                        </p:tgtEl>
+                                        <p:attrNameLst>
+                                          <p:attrName>style.visibility</p:attrName>
+                                        </p:attrNameLst>
+                                      </p:cBhvr>
+                                      <p:to>
+                                        <p:strVal val="visible"/>
+                                      </p:to>
+                                    </p:set>
+                                  </p:childTnLst>
+                                </p:cTn>
+                              </p:par>
+                            </p:childTnLst>
+                          </p:cTn>
+                        </p:par>
+                      </p:childTnLst>
+                    </p:cTn>
+                  </p:par>
+                </p:childTnLst>
+              </p:cTn>
+              <p:prevCondLst>
+                <p:cond evt="onPrev" delay="0">
+                  <p:tgtEl>
+                    <p:sldTgt/>
+                  </p:tgtEl>
+                </p:cond>
+              </p:prevCondLst>
+              <p:nextCondLst>
+                <p:cond evt="onNext" delay="0">
+                  <p:tgtEl>
+                    <p:sldTgt/>
+                  </p:tgtEl>
+                </p:cond>
+              </p:nextCondLst>
+            </p:seq>
+          </p:childTnLst>
+        </p:cTn>
+      </p:par>
+    </p:tnLst>
+  </p:timing>
 </p:sld>
 </file>
 
@@ -5355,52 +6024,384 @@
           </a:p>
         </p:txBody>
       </p:sp>
-      <p:sp>
-        <p:nvSpPr>
-          <p:cNvPr id="5" name="Content Placeholder 4">
-            <a:extLst>
-              <a:ext uri="{FF2B5EF4-FFF2-40B4-BE49-F238E27FC236}">
-                <a16:creationId xmlns:a16="http://schemas.microsoft.com/office/drawing/2014/main" id="{9A8F98F4-37C5-1D8C-C021-686D905E4B21}"/>
-              </a:ext>
-            </a:extLst>
-          </p:cNvPr>
-          <p:cNvSpPr>
-            <a:spLocks noGrp="1"/>
-          </p:cNvSpPr>
+      <p:pic>
+        <p:nvPicPr>
+          <p:cNvPr id="3" name="Content Placeholder 2" descr="Graphical user interface, application&#10;&#10;Description automatically generated">
+            <a:extLst>
+              <a:ext uri="{FF2B5EF4-FFF2-40B4-BE49-F238E27FC236}">
+                <a16:creationId xmlns:a16="http://schemas.microsoft.com/office/drawing/2014/main" id="{5B78D4C1-A3A5-12C4-B16A-988548BAAEB4}"/>
+              </a:ext>
+            </a:extLst>
+          </p:cNvPr>
+          <p:cNvPicPr>
+            <a:picLocks noGrp="1" noChangeAspect="1"/>
+          </p:cNvPicPr>
           <p:nvPr>
             <p:ph sz="half" idx="1"/>
           </p:nvPr>
-        </p:nvSpPr>
-        <p:spPr/>
-        <p:txBody>
-          <a:bodyPr/>
+        </p:nvPicPr>
+        <p:blipFill rotWithShape="1">
+          <a:blip r:embed="rId2">
+            <a:extLst>
+              <a:ext uri="{28A0092B-C50C-407E-A947-70E740481C1C}">
+                <a14:useLocalDpi xmlns:a14="http://schemas.microsoft.com/office/drawing/2010/main" val="0"/>
+              </a:ext>
+            </a:extLst>
+          </a:blip>
+          <a:srcRect t="12050" r="67575" b="83244"/>
+          <a:stretch/>
+        </p:blipFill>
+        <p:spPr>
+          <a:xfrm>
+            <a:off x="233586" y="1806678"/>
+            <a:ext cx="4199343" cy="369332"/>
+          </a:xfrm>
+        </p:spPr>
+      </p:pic>
+      <p:pic>
+        <p:nvPicPr>
+          <p:cNvPr id="10" name="Content Placeholder 9" descr="Graphical user interface, application&#10;&#10;Description automatically generated">
+            <a:extLst>
+              <a:ext uri="{FF2B5EF4-FFF2-40B4-BE49-F238E27FC236}">
+                <a16:creationId xmlns:a16="http://schemas.microsoft.com/office/drawing/2014/main" id="{03C0E5E3-4325-6FE9-9034-4B0F66053D21}"/>
+              </a:ext>
+            </a:extLst>
+          </p:cNvPr>
+          <p:cNvPicPr>
+            <a:picLocks noGrp="1" noChangeAspect="1"/>
+          </p:cNvPicPr>
+          <p:nvPr>
+            <p:ph sz="half" idx="2"/>
+          </p:nvPr>
+        </p:nvPicPr>
+        <p:blipFill rotWithShape="1">
+          <a:blip r:embed="rId3">
+            <a:extLst>
+              <a:ext uri="{28A0092B-C50C-407E-A947-70E740481C1C}">
+                <a14:useLocalDpi xmlns:a14="http://schemas.microsoft.com/office/drawing/2010/main" val="0"/>
+              </a:ext>
+            </a:extLst>
+          </a:blip>
+          <a:srcRect t="12250" r="67759" b="83723"/>
+          <a:stretch/>
+        </p:blipFill>
+        <p:spPr>
+          <a:xfrm>
+            <a:off x="5898697" y="1753863"/>
+            <a:ext cx="4602319" cy="351345"/>
+          </a:xfrm>
+        </p:spPr>
+      </p:pic>
+      <p:sp>
+        <p:nvSpPr>
+          <p:cNvPr id="7" name="TextBox 6">
+            <a:extLst>
+              <a:ext uri="{FF2B5EF4-FFF2-40B4-BE49-F238E27FC236}">
+                <a16:creationId xmlns:a16="http://schemas.microsoft.com/office/drawing/2014/main" id="{9FEFB42A-F795-1794-FE3D-BABF9CEC51E1}"/>
+              </a:ext>
+            </a:extLst>
+          </p:cNvPr>
+          <p:cNvSpPr txBox="1"/>
+          <p:nvPr/>
+        </p:nvSpPr>
+        <p:spPr>
+          <a:xfrm>
+            <a:off x="290874" y="1384531"/>
+            <a:ext cx="1449532" cy="369332"/>
+          </a:xfrm>
+          <a:prstGeom prst="rect">
+            <a:avLst/>
+          </a:prstGeom>
+          <a:noFill/>
+        </p:spPr>
+        <p:txBody>
+          <a:bodyPr wrap="square" rtlCol="0">
+            <a:spAutoFit/>
+          </a:bodyPr>
           <a:lstStyle/>
           <a:p>
+            <a:r>
+              <a:rPr lang="en-US" b="1" dirty="0"/>
+              <a:t>SMOTEENN:</a:t>
+            </a:r>
+          </a:p>
+        </p:txBody>
+      </p:sp>
+      <p:sp>
+        <p:nvSpPr>
+          <p:cNvPr id="8" name="TextBox 7">
+            <a:extLst>
+              <a:ext uri="{FF2B5EF4-FFF2-40B4-BE49-F238E27FC236}">
+                <a16:creationId xmlns:a16="http://schemas.microsoft.com/office/drawing/2014/main" id="{FB166FB8-77D3-928C-AED0-1C6DEB31BF42}"/>
+              </a:ext>
+            </a:extLst>
+          </p:cNvPr>
+          <p:cNvSpPr txBox="1"/>
+          <p:nvPr/>
+        </p:nvSpPr>
+        <p:spPr>
+          <a:xfrm>
+            <a:off x="5979763" y="1320998"/>
+            <a:ext cx="1449532" cy="369332"/>
+          </a:xfrm>
+          <a:prstGeom prst="rect">
+            <a:avLst/>
+          </a:prstGeom>
+          <a:noFill/>
+        </p:spPr>
+        <p:txBody>
+          <a:bodyPr wrap="square" rtlCol="0">
+            <a:spAutoFit/>
+          </a:bodyPr>
+          <a:lstStyle/>
+          <a:p>
+            <a:r>
+              <a:rPr lang="en-US" b="1" dirty="0"/>
+              <a:t>SMOTE:</a:t>
+            </a:r>
+          </a:p>
+        </p:txBody>
+      </p:sp>
+      <p:pic>
+        <p:nvPicPr>
+          <p:cNvPr id="16" name="Picture 15" descr="Graphical user interface, application&#10;&#10;Description automatically generated">
+            <a:extLst>
+              <a:ext uri="{FF2B5EF4-FFF2-40B4-BE49-F238E27FC236}">
+                <a16:creationId xmlns:a16="http://schemas.microsoft.com/office/drawing/2014/main" id="{B82E209E-B31E-4DED-8D25-EC2F43A09573}"/>
+              </a:ext>
+            </a:extLst>
+          </p:cNvPr>
+          <p:cNvPicPr>
+            <a:picLocks noChangeAspect="1"/>
+          </p:cNvPicPr>
+          <p:nvPr/>
+        </p:nvPicPr>
+        <p:blipFill rotWithShape="1">
+          <a:blip r:embed="rId2">
+            <a:extLst>
+              <a:ext uri="{28A0092B-C50C-407E-A947-70E740481C1C}">
+                <a14:useLocalDpi xmlns:a14="http://schemas.microsoft.com/office/drawing/2010/main" val="0"/>
+              </a:ext>
+            </a:extLst>
+          </a:blip>
+          <a:srcRect t="46830" r="62658" b="35343"/>
+          <a:stretch/>
+        </p:blipFill>
+        <p:spPr>
+          <a:xfrm>
+            <a:off x="330630" y="2633870"/>
+            <a:ext cx="4915467" cy="1422128"/>
+          </a:xfrm>
+          <a:prstGeom prst="rect">
+            <a:avLst/>
+          </a:prstGeom>
+        </p:spPr>
+      </p:pic>
+      <p:pic>
+        <p:nvPicPr>
+          <p:cNvPr id="18" name="Picture 17" descr="Graphical user interface, application&#10;&#10;Description automatically generated">
+            <a:extLst>
+              <a:ext uri="{FF2B5EF4-FFF2-40B4-BE49-F238E27FC236}">
+                <a16:creationId xmlns:a16="http://schemas.microsoft.com/office/drawing/2014/main" id="{7D620683-027D-7B18-94AE-5C648BF54452}"/>
+              </a:ext>
+            </a:extLst>
+          </p:cNvPr>
+          <p:cNvPicPr>
+            <a:picLocks noChangeAspect="1"/>
+          </p:cNvPicPr>
+          <p:nvPr/>
+        </p:nvPicPr>
+        <p:blipFill rotWithShape="1">
+          <a:blip r:embed="rId2">
+            <a:extLst>
+              <a:ext uri="{28A0092B-C50C-407E-A947-70E740481C1C}">
+                <a14:useLocalDpi xmlns:a14="http://schemas.microsoft.com/office/drawing/2010/main" val="0"/>
+              </a:ext>
+            </a:extLst>
+          </a:blip>
+          <a:srcRect t="82598" r="62564" b="3547"/>
+          <a:stretch/>
+        </p:blipFill>
+        <p:spPr>
+          <a:xfrm>
+            <a:off x="183891" y="4668037"/>
+            <a:ext cx="5342662" cy="1198345"/>
+          </a:xfrm>
+          <a:prstGeom prst="rect">
+            <a:avLst/>
+          </a:prstGeom>
+        </p:spPr>
+      </p:pic>
+      <p:pic>
+        <p:nvPicPr>
+          <p:cNvPr id="22" name="Picture 21" descr="Graphical user interface, application&#10;&#10;Description automatically generated">
+            <a:extLst>
+              <a:ext uri="{FF2B5EF4-FFF2-40B4-BE49-F238E27FC236}">
+                <a16:creationId xmlns:a16="http://schemas.microsoft.com/office/drawing/2014/main" id="{3C10C9A5-B4A1-53A5-A28B-E00AB8AF8B45}"/>
+              </a:ext>
+            </a:extLst>
+          </p:cNvPr>
+          <p:cNvPicPr>
+            <a:picLocks noChangeAspect="1"/>
+          </p:cNvPicPr>
+          <p:nvPr/>
+        </p:nvPicPr>
+        <p:blipFill rotWithShape="1">
+          <a:blip r:embed="rId3">
+            <a:extLst>
+              <a:ext uri="{28A0092B-C50C-407E-A947-70E740481C1C}">
+                <a14:useLocalDpi xmlns:a14="http://schemas.microsoft.com/office/drawing/2010/main" val="0"/>
+              </a:ext>
+            </a:extLst>
+          </a:blip>
+          <a:srcRect t="46072" r="62325" b="37630"/>
+          <a:stretch/>
+        </p:blipFill>
+        <p:spPr>
+          <a:xfrm>
+            <a:off x="5986374" y="2558824"/>
+            <a:ext cx="5013471" cy="1325563"/>
+          </a:xfrm>
+          <a:prstGeom prst="rect">
+            <a:avLst/>
+          </a:prstGeom>
+        </p:spPr>
+      </p:pic>
+      <p:pic>
+        <p:nvPicPr>
+          <p:cNvPr id="24" name="Picture 23" descr="Graphical user interface, application&#10;&#10;Description automatically generated">
+            <a:extLst>
+              <a:ext uri="{FF2B5EF4-FFF2-40B4-BE49-F238E27FC236}">
+                <a16:creationId xmlns:a16="http://schemas.microsoft.com/office/drawing/2014/main" id="{7F5190E4-7139-789F-1AC4-A754C0E4D3EA}"/>
+              </a:ext>
+            </a:extLst>
+          </p:cNvPr>
+          <p:cNvPicPr>
+            <a:picLocks noChangeAspect="1"/>
+          </p:cNvPicPr>
+          <p:nvPr/>
+        </p:nvPicPr>
+        <p:blipFill rotWithShape="1">
+          <a:blip r:embed="rId3">
+            <a:extLst>
+              <a:ext uri="{28A0092B-C50C-407E-A947-70E740481C1C}">
+                <a14:useLocalDpi xmlns:a14="http://schemas.microsoft.com/office/drawing/2010/main" val="0"/>
+              </a:ext>
+            </a:extLst>
+          </a:blip>
+          <a:srcRect t="82323" r="62997" b="4273"/>
+          <a:stretch/>
+        </p:blipFill>
+        <p:spPr>
+          <a:xfrm>
+            <a:off x="5976435" y="4668037"/>
+            <a:ext cx="5412549" cy="1198345"/>
+          </a:xfrm>
+          <a:prstGeom prst="rect">
+            <a:avLst/>
+          </a:prstGeom>
+        </p:spPr>
+      </p:pic>
+      <p:sp>
+        <p:nvSpPr>
+          <p:cNvPr id="25" name="Rectangle 24">
+            <a:extLst>
+              <a:ext uri="{FF2B5EF4-FFF2-40B4-BE49-F238E27FC236}">
+                <a16:creationId xmlns:a16="http://schemas.microsoft.com/office/drawing/2014/main" id="{FF54D066-0DFA-FAA1-6A94-7E66BC547845}"/>
+              </a:ext>
+            </a:extLst>
+          </p:cNvPr>
+          <p:cNvSpPr/>
+          <p:nvPr/>
+        </p:nvSpPr>
+        <p:spPr>
+          <a:xfrm>
+            <a:off x="1061648" y="5267208"/>
+            <a:ext cx="2420854" cy="530477"/>
+          </a:xfrm>
+          <a:prstGeom prst="rect">
+            <a:avLst/>
+          </a:prstGeom>
+          <a:noFill/>
+          <a:ln w="28575">
+            <a:solidFill>
+              <a:srgbClr val="FF0000"/>
+            </a:solidFill>
+          </a:ln>
+        </p:spPr>
+        <p:style>
+          <a:lnRef idx="2">
+            <a:schemeClr val="accent1">
+              <a:shade val="50000"/>
+            </a:schemeClr>
+          </a:lnRef>
+          <a:fillRef idx="1">
+            <a:schemeClr val="accent1"/>
+          </a:fillRef>
+          <a:effectRef idx="0">
+            <a:schemeClr val="accent1"/>
+          </a:effectRef>
+          <a:fontRef idx="minor">
+            <a:schemeClr val="lt1"/>
+          </a:fontRef>
+        </p:style>
+        <p:txBody>
+          <a:bodyPr rtlCol="0" anchor="ctr"/>
+          <a:lstStyle/>
+          <a:p>
+            <a:pPr algn="ctr"/>
             <a:endParaRPr lang="en-US"/>
           </a:p>
         </p:txBody>
       </p:sp>
       <p:sp>
         <p:nvSpPr>
-          <p:cNvPr id="6" name="Content Placeholder 5">
-            <a:extLst>
-              <a:ext uri="{FF2B5EF4-FFF2-40B4-BE49-F238E27FC236}">
-                <a16:creationId xmlns:a16="http://schemas.microsoft.com/office/drawing/2014/main" id="{D1988B17-50DE-A9D9-AD44-B94C2B0C84AF}"/>
-              </a:ext>
-            </a:extLst>
-          </p:cNvPr>
-          <p:cNvSpPr>
-            <a:spLocks noGrp="1"/>
-          </p:cNvSpPr>
-          <p:nvPr>
-            <p:ph sz="half" idx="2"/>
-          </p:nvPr>
-        </p:nvSpPr>
-        <p:spPr/>
-        <p:txBody>
-          <a:bodyPr/>
+          <p:cNvPr id="26" name="Rectangle 25">
+            <a:extLst>
+              <a:ext uri="{FF2B5EF4-FFF2-40B4-BE49-F238E27FC236}">
+                <a16:creationId xmlns:a16="http://schemas.microsoft.com/office/drawing/2014/main" id="{0DD5D405-5FF1-0B56-D9C2-98E282F1D46E}"/>
+              </a:ext>
+            </a:extLst>
+          </p:cNvPr>
+          <p:cNvSpPr/>
+          <p:nvPr/>
+        </p:nvSpPr>
+        <p:spPr>
+          <a:xfrm>
+            <a:off x="6885274" y="5267208"/>
+            <a:ext cx="2420854" cy="530477"/>
+          </a:xfrm>
+          <a:prstGeom prst="rect">
+            <a:avLst/>
+          </a:prstGeom>
+          <a:noFill/>
+          <a:ln w="28575">
+            <a:solidFill>
+              <a:srgbClr val="FF0000"/>
+            </a:solidFill>
+          </a:ln>
+        </p:spPr>
+        <p:style>
+          <a:lnRef idx="2">
+            <a:schemeClr val="accent1">
+              <a:shade val="50000"/>
+            </a:schemeClr>
+          </a:lnRef>
+          <a:fillRef idx="1">
+            <a:schemeClr val="accent1"/>
+          </a:fillRef>
+          <a:effectRef idx="0">
+            <a:schemeClr val="accent1"/>
+          </a:effectRef>
+          <a:fontRef idx="minor">
+            <a:schemeClr val="lt1"/>
+          </a:fontRef>
+        </p:style>
+        <p:txBody>
+          <a:bodyPr rtlCol="0" anchor="ctr"/>
           <a:lstStyle/>
           <a:p>
+            <a:pPr algn="ctr"/>
             <a:endParaRPr lang="en-US"/>
           </a:p>
         </p:txBody>
@@ -5415,6 +6416,420 @@
   <p:clrMapOvr>
     <a:masterClrMapping/>
   </p:clrMapOvr>
+  <p:timing>
+    <p:tnLst>
+      <p:par>
+        <p:cTn id="1" dur="indefinite" restart="never" nodeType="tmRoot">
+          <p:childTnLst>
+            <p:seq concurrent="1" nextAc="seek">
+              <p:cTn id="2" dur="indefinite" nodeType="mainSeq">
+                <p:childTnLst>
+                  <p:par>
+                    <p:cTn id="3" fill="hold">
+                      <p:stCondLst>
+                        <p:cond delay="indefinite"/>
+                      </p:stCondLst>
+                      <p:childTnLst>
+                        <p:par>
+                          <p:cTn id="4" fill="hold">
+                            <p:stCondLst>
+                              <p:cond delay="0"/>
+                            </p:stCondLst>
+                            <p:childTnLst>
+                              <p:par>
+                                <p:cTn id="5" presetID="1" presetClass="entr" presetSubtype="0" fill="hold" grpId="0" nodeType="clickEffect">
+                                  <p:stCondLst>
+                                    <p:cond delay="0"/>
+                                  </p:stCondLst>
+                                  <p:childTnLst>
+                                    <p:set>
+                                      <p:cBhvr>
+                                        <p:cTn id="6" dur="1" fill="hold">
+                                          <p:stCondLst>
+                                            <p:cond delay="0"/>
+                                          </p:stCondLst>
+                                        </p:cTn>
+                                        <p:tgtEl>
+                                          <p:spTgt spid="7"/>
+                                        </p:tgtEl>
+                                        <p:attrNameLst>
+                                          <p:attrName>style.visibility</p:attrName>
+                                        </p:attrNameLst>
+                                      </p:cBhvr>
+                                      <p:to>
+                                        <p:strVal val="visible"/>
+                                      </p:to>
+                                    </p:set>
+                                  </p:childTnLst>
+                                </p:cTn>
+                              </p:par>
+                              <p:par>
+                                <p:cTn id="7" presetID="1" presetClass="entr" presetSubtype="0" fill="hold" nodeType="withEffect">
+                                  <p:stCondLst>
+                                    <p:cond delay="0"/>
+                                  </p:stCondLst>
+                                  <p:childTnLst>
+                                    <p:set>
+                                      <p:cBhvr>
+                                        <p:cTn id="8" dur="1" fill="hold">
+                                          <p:stCondLst>
+                                            <p:cond delay="0"/>
+                                          </p:stCondLst>
+                                        </p:cTn>
+                                        <p:tgtEl>
+                                          <p:spTgt spid="3"/>
+                                        </p:tgtEl>
+                                        <p:attrNameLst>
+                                          <p:attrName>style.visibility</p:attrName>
+                                        </p:attrNameLst>
+                                      </p:cBhvr>
+                                      <p:to>
+                                        <p:strVal val="visible"/>
+                                      </p:to>
+                                    </p:set>
+                                  </p:childTnLst>
+                                </p:cTn>
+                              </p:par>
+                            </p:childTnLst>
+                          </p:cTn>
+                        </p:par>
+                      </p:childTnLst>
+                    </p:cTn>
+                  </p:par>
+                  <p:par>
+                    <p:cTn id="9" fill="hold">
+                      <p:stCondLst>
+                        <p:cond delay="indefinite"/>
+                      </p:stCondLst>
+                      <p:childTnLst>
+                        <p:par>
+                          <p:cTn id="10" fill="hold">
+                            <p:stCondLst>
+                              <p:cond delay="0"/>
+                            </p:stCondLst>
+                            <p:childTnLst>
+                              <p:par>
+                                <p:cTn id="11" presetID="1" presetClass="entr" presetSubtype="0" fill="hold" nodeType="clickEffect">
+                                  <p:stCondLst>
+                                    <p:cond delay="0"/>
+                                  </p:stCondLst>
+                                  <p:childTnLst>
+                                    <p:set>
+                                      <p:cBhvr>
+                                        <p:cTn id="12" dur="1" fill="hold">
+                                          <p:stCondLst>
+                                            <p:cond delay="0"/>
+                                          </p:stCondLst>
+                                        </p:cTn>
+                                        <p:tgtEl>
+                                          <p:spTgt spid="16"/>
+                                        </p:tgtEl>
+                                        <p:attrNameLst>
+                                          <p:attrName>style.visibility</p:attrName>
+                                        </p:attrNameLst>
+                                      </p:cBhvr>
+                                      <p:to>
+                                        <p:strVal val="visible"/>
+                                      </p:to>
+                                    </p:set>
+                                  </p:childTnLst>
+                                </p:cTn>
+                              </p:par>
+                            </p:childTnLst>
+                          </p:cTn>
+                        </p:par>
+                      </p:childTnLst>
+                    </p:cTn>
+                  </p:par>
+                  <p:par>
+                    <p:cTn id="13" fill="hold">
+                      <p:stCondLst>
+                        <p:cond delay="indefinite"/>
+                      </p:stCondLst>
+                      <p:childTnLst>
+                        <p:par>
+                          <p:cTn id="14" fill="hold">
+                            <p:stCondLst>
+                              <p:cond delay="0"/>
+                            </p:stCondLst>
+                            <p:childTnLst>
+                              <p:par>
+                                <p:cTn id="15" presetID="1" presetClass="entr" presetSubtype="0" fill="hold" nodeType="clickEffect">
+                                  <p:stCondLst>
+                                    <p:cond delay="0"/>
+                                  </p:stCondLst>
+                                  <p:childTnLst>
+                                    <p:set>
+                                      <p:cBhvr>
+                                        <p:cTn id="16" dur="1" fill="hold">
+                                          <p:stCondLst>
+                                            <p:cond delay="0"/>
+                                          </p:stCondLst>
+                                        </p:cTn>
+                                        <p:tgtEl>
+                                          <p:spTgt spid="18"/>
+                                        </p:tgtEl>
+                                        <p:attrNameLst>
+                                          <p:attrName>style.visibility</p:attrName>
+                                        </p:attrNameLst>
+                                      </p:cBhvr>
+                                      <p:to>
+                                        <p:strVal val="visible"/>
+                                      </p:to>
+                                    </p:set>
+                                  </p:childTnLst>
+                                </p:cTn>
+                              </p:par>
+                              <p:par>
+                                <p:cTn id="17" presetID="1" presetClass="entr" presetSubtype="0" fill="hold" grpId="0" nodeType="withEffect">
+                                  <p:stCondLst>
+                                    <p:cond delay="0"/>
+                                  </p:stCondLst>
+                                  <p:childTnLst>
+                                    <p:set>
+                                      <p:cBhvr>
+                                        <p:cTn id="18" dur="1" fill="hold">
+                                          <p:stCondLst>
+                                            <p:cond delay="0"/>
+                                          </p:stCondLst>
+                                        </p:cTn>
+                                        <p:tgtEl>
+                                          <p:spTgt spid="25"/>
+                                        </p:tgtEl>
+                                        <p:attrNameLst>
+                                          <p:attrName>style.visibility</p:attrName>
+                                        </p:attrNameLst>
+                                      </p:cBhvr>
+                                      <p:to>
+                                        <p:strVal val="visible"/>
+                                      </p:to>
+                                    </p:set>
+                                  </p:childTnLst>
+                                </p:cTn>
+                              </p:par>
+                            </p:childTnLst>
+                          </p:cTn>
+                        </p:par>
+                      </p:childTnLst>
+                    </p:cTn>
+                  </p:par>
+                  <p:par>
+                    <p:cTn id="19" fill="hold">
+                      <p:stCondLst>
+                        <p:cond delay="indefinite"/>
+                      </p:stCondLst>
+                      <p:childTnLst>
+                        <p:par>
+                          <p:cTn id="20" fill="hold">
+                            <p:stCondLst>
+                              <p:cond delay="0"/>
+                            </p:stCondLst>
+                            <p:childTnLst>
+                              <p:par>
+                                <p:cTn id="21" presetID="1" presetClass="entr" presetSubtype="0" fill="hold" nodeType="clickEffect">
+                                  <p:stCondLst>
+                                    <p:cond delay="0"/>
+                                  </p:stCondLst>
+                                  <p:childTnLst>
+                                    <p:set>
+                                      <p:cBhvr>
+                                        <p:cTn id="22" dur="1" fill="hold">
+                                          <p:stCondLst>
+                                            <p:cond delay="0"/>
+                                          </p:stCondLst>
+                                        </p:cTn>
+                                        <p:tgtEl>
+                                          <p:spTgt spid="10"/>
+                                        </p:tgtEl>
+                                        <p:attrNameLst>
+                                          <p:attrName>style.visibility</p:attrName>
+                                        </p:attrNameLst>
+                                      </p:cBhvr>
+                                      <p:to>
+                                        <p:strVal val="visible"/>
+                                      </p:to>
+                                    </p:set>
+                                  </p:childTnLst>
+                                </p:cTn>
+                              </p:par>
+                              <p:par>
+                                <p:cTn id="23" presetID="1" presetClass="entr" presetSubtype="0" fill="hold" grpId="0" nodeType="withEffect">
+                                  <p:stCondLst>
+                                    <p:cond delay="0"/>
+                                  </p:stCondLst>
+                                  <p:childTnLst>
+                                    <p:set>
+                                      <p:cBhvr>
+                                        <p:cTn id="24" dur="1" fill="hold">
+                                          <p:stCondLst>
+                                            <p:cond delay="0"/>
+                                          </p:stCondLst>
+                                        </p:cTn>
+                                        <p:tgtEl>
+                                          <p:spTgt spid="8"/>
+                                        </p:tgtEl>
+                                        <p:attrNameLst>
+                                          <p:attrName>style.visibility</p:attrName>
+                                        </p:attrNameLst>
+                                      </p:cBhvr>
+                                      <p:to>
+                                        <p:strVal val="visible"/>
+                                      </p:to>
+                                    </p:set>
+                                  </p:childTnLst>
+                                </p:cTn>
+                              </p:par>
+                            </p:childTnLst>
+                          </p:cTn>
+                        </p:par>
+                      </p:childTnLst>
+                    </p:cTn>
+                  </p:par>
+                  <p:par>
+                    <p:cTn id="25" fill="hold">
+                      <p:stCondLst>
+                        <p:cond delay="indefinite"/>
+                      </p:stCondLst>
+                      <p:childTnLst>
+                        <p:par>
+                          <p:cTn id="26" fill="hold">
+                            <p:stCondLst>
+                              <p:cond delay="0"/>
+                            </p:stCondLst>
+                            <p:childTnLst>
+                              <p:par>
+                                <p:cTn id="27" presetID="1" presetClass="entr" presetSubtype="0" fill="hold" nodeType="clickEffect">
+                                  <p:stCondLst>
+                                    <p:cond delay="0"/>
+                                  </p:stCondLst>
+                                  <p:childTnLst>
+                                    <p:set>
+                                      <p:cBhvr>
+                                        <p:cTn id="28" dur="1" fill="hold">
+                                          <p:stCondLst>
+                                            <p:cond delay="0"/>
+                                          </p:stCondLst>
+                                        </p:cTn>
+                                        <p:tgtEl>
+                                          <p:spTgt spid="22"/>
+                                        </p:tgtEl>
+                                        <p:attrNameLst>
+                                          <p:attrName>style.visibility</p:attrName>
+                                        </p:attrNameLst>
+                                      </p:cBhvr>
+                                      <p:to>
+                                        <p:strVal val="visible"/>
+                                      </p:to>
+                                    </p:set>
+                                  </p:childTnLst>
+                                </p:cTn>
+                              </p:par>
+                            </p:childTnLst>
+                          </p:cTn>
+                        </p:par>
+                      </p:childTnLst>
+                    </p:cTn>
+                  </p:par>
+                  <p:par>
+                    <p:cTn id="29" fill="hold">
+                      <p:stCondLst>
+                        <p:cond delay="indefinite"/>
+                      </p:stCondLst>
+                      <p:childTnLst>
+                        <p:par>
+                          <p:cTn id="30" fill="hold">
+                            <p:stCondLst>
+                              <p:cond delay="0"/>
+                            </p:stCondLst>
+                            <p:childTnLst>
+                              <p:par>
+                                <p:cTn id="31" presetID="1" presetClass="entr" presetSubtype="0" fill="hold" nodeType="clickEffect">
+                                  <p:stCondLst>
+                                    <p:cond delay="0"/>
+                                  </p:stCondLst>
+                                  <p:childTnLst>
+                                    <p:set>
+                                      <p:cBhvr>
+                                        <p:cTn id="32" dur="1" fill="hold">
+                                          <p:stCondLst>
+                                            <p:cond delay="0"/>
+                                          </p:stCondLst>
+                                        </p:cTn>
+                                        <p:tgtEl>
+                                          <p:spTgt spid="24"/>
+                                        </p:tgtEl>
+                                        <p:attrNameLst>
+                                          <p:attrName>style.visibility</p:attrName>
+                                        </p:attrNameLst>
+                                      </p:cBhvr>
+                                      <p:to>
+                                        <p:strVal val="visible"/>
+                                      </p:to>
+                                    </p:set>
+                                  </p:childTnLst>
+                                </p:cTn>
+                              </p:par>
+                              <p:par>
+                                <p:cTn id="33" presetID="1" presetClass="entr" presetSubtype="0" fill="hold" grpId="0" nodeType="withEffect">
+                                  <p:stCondLst>
+                                    <p:cond delay="0"/>
+                                  </p:stCondLst>
+                                  <p:childTnLst>
+                                    <p:set>
+                                      <p:cBhvr>
+                                        <p:cTn id="34" dur="1" fill="hold">
+                                          <p:stCondLst>
+                                            <p:cond delay="0"/>
+                                          </p:stCondLst>
+                                        </p:cTn>
+                                        <p:tgtEl>
+                                          <p:spTgt spid="26"/>
+                                        </p:tgtEl>
+                                        <p:attrNameLst>
+                                          <p:attrName>style.visibility</p:attrName>
+                                        </p:attrNameLst>
+                                      </p:cBhvr>
+                                      <p:to>
+                                        <p:strVal val="visible"/>
+                                      </p:to>
+                                    </p:set>
+                                  </p:childTnLst>
+                                </p:cTn>
+                              </p:par>
+                            </p:childTnLst>
+                          </p:cTn>
+                        </p:par>
+                      </p:childTnLst>
+                    </p:cTn>
+                  </p:par>
+                </p:childTnLst>
+              </p:cTn>
+              <p:prevCondLst>
+                <p:cond evt="onPrev" delay="0">
+                  <p:tgtEl>
+                    <p:sldTgt/>
+                  </p:tgtEl>
+                </p:cond>
+              </p:prevCondLst>
+              <p:nextCondLst>
+                <p:cond evt="onNext" delay="0">
+                  <p:tgtEl>
+                    <p:sldTgt/>
+                  </p:tgtEl>
+                </p:cond>
+              </p:nextCondLst>
+            </p:seq>
+          </p:childTnLst>
+        </p:cTn>
+      </p:par>
+    </p:tnLst>
+    <p:bldLst>
+      <p:bldP spid="7" grpId="0"/>
+      <p:bldP spid="8" grpId="0"/>
+      <p:bldP spid="25" grpId="0" animBg="1"/>
+      <p:bldP spid="26" grpId="0" animBg="1"/>
+    </p:bldLst>
+  </p:timing>
 </p:sld>
 </file>
 
@@ -5484,7 +6899,27 @@
           <a:bodyPr/>
           <a:lstStyle/>
           <a:p>
-            <a:endParaRPr lang="en-US"/>
+            <a:r>
+              <a:rPr lang="en-US" i="0" dirty="0">
+                <a:effectLst/>
+              </a:rPr>
+              <a:t>The model is not a good predictor of high or low income areas when using digital sale transactions.</a:t>
+            </a:r>
+          </a:p>
+          <a:p>
+            <a:r>
+              <a:rPr lang="en-US" dirty="0"/>
+              <a:t>Recall improved for predicting low income areas but decreased for high income areas with SMOTE.</a:t>
+            </a:r>
+            <a:endParaRPr lang="en-US" i="0" dirty="0">
+              <a:effectLst/>
+            </a:endParaRPr>
+          </a:p>
+          <a:p>
+            <a:pPr marL="0" indent="0">
+              <a:buNone/>
+            </a:pPr>
+            <a:endParaRPr lang="en-US" dirty="0"/>
           </a:p>
         </p:txBody>
       </p:sp>
@@ -5523,6 +6958,134 @@
   <p:clrMapOvr>
     <a:masterClrMapping/>
   </p:clrMapOvr>
+  <p:timing>
+    <p:tnLst>
+      <p:par>
+        <p:cTn id="1" dur="indefinite" restart="never" nodeType="tmRoot">
+          <p:childTnLst>
+            <p:seq concurrent="1" nextAc="seek">
+              <p:cTn id="2" dur="indefinite" nodeType="mainSeq">
+                <p:childTnLst>
+                  <p:par>
+                    <p:cTn id="3" fill="hold">
+                      <p:stCondLst>
+                        <p:cond delay="indefinite"/>
+                      </p:stCondLst>
+                      <p:childTnLst>
+                        <p:par>
+                          <p:cTn id="4" fill="hold">
+                            <p:stCondLst>
+                              <p:cond delay="0"/>
+                            </p:stCondLst>
+                            <p:childTnLst>
+                              <p:par>
+                                <p:cTn id="5" presetID="1" presetClass="entr" presetSubtype="0" fill="hold" nodeType="clickEffect">
+                                  <p:stCondLst>
+                                    <p:cond delay="0"/>
+                                  </p:stCondLst>
+                                  <p:childTnLst>
+                                    <p:set>
+                                      <p:cBhvr>
+                                        <p:cTn id="6" dur="1" fill="hold">
+                                          <p:stCondLst>
+                                            <p:cond delay="0"/>
+                                          </p:stCondLst>
+                                        </p:cTn>
+                                        <p:tgtEl>
+                                          <p:spTgt spid="4">
+                                            <p:txEl>
+                                              <p:pRg st="0" end="0"/>
+                                            </p:txEl>
+                                          </p:spTgt>
+                                        </p:tgtEl>
+                                        <p:attrNameLst>
+                                          <p:attrName>style.visibility</p:attrName>
+                                        </p:attrNameLst>
+                                      </p:cBhvr>
+                                      <p:to>
+                                        <p:strVal val="visible"/>
+                                      </p:to>
+                                    </p:set>
+                                  </p:childTnLst>
+                                </p:cTn>
+                              </p:par>
+                            </p:childTnLst>
+                          </p:cTn>
+                        </p:par>
+                      </p:childTnLst>
+                    </p:cTn>
+                  </p:par>
+                  <p:par>
+                    <p:cTn id="7" fill="hold">
+                      <p:stCondLst>
+                        <p:cond delay="indefinite"/>
+                      </p:stCondLst>
+                      <p:childTnLst>
+                        <p:par>
+                          <p:cTn id="8" fill="hold">
+                            <p:stCondLst>
+                              <p:cond delay="0"/>
+                            </p:stCondLst>
+                            <p:childTnLst>
+                              <p:par>
+                                <p:cTn id="9" presetID="1" presetClass="entr" presetSubtype="0" fill="hold" nodeType="clickEffect">
+                                  <p:stCondLst>
+                                    <p:cond delay="0"/>
+                                  </p:stCondLst>
+                                  <p:childTnLst>
+                                    <p:set>
+                                      <p:cBhvr>
+                                        <p:cTn id="10" dur="1" fill="hold">
+                                          <p:stCondLst>
+                                            <p:cond delay="0"/>
+                                          </p:stCondLst>
+                                        </p:cTn>
+                                        <p:tgtEl>
+                                          <p:spTgt spid="4">
+                                            <p:txEl>
+                                              <p:pRg st="1" end="1"/>
+                                            </p:txEl>
+                                          </p:spTgt>
+                                        </p:tgtEl>
+                                        <p:attrNameLst>
+                                          <p:attrName>style.visibility</p:attrName>
+                                        </p:attrNameLst>
+                                      </p:cBhvr>
+                                      <p:to>
+                                        <p:strVal val="visible"/>
+                                      </p:to>
+                                    </p:set>
+                                  </p:childTnLst>
+                                </p:cTn>
+                              </p:par>
+                            </p:childTnLst>
+                          </p:cTn>
+                        </p:par>
+                      </p:childTnLst>
+                    </p:cTn>
+                  </p:par>
+                </p:childTnLst>
+              </p:cTn>
+              <p:prevCondLst>
+                <p:cond evt="onPrev" delay="0">
+                  <p:tgtEl>
+                    <p:sldTgt/>
+                  </p:tgtEl>
+                </p:cond>
+              </p:prevCondLst>
+              <p:nextCondLst>
+                <p:cond evt="onNext" delay="0">
+                  <p:tgtEl>
+                    <p:sldTgt/>
+                  </p:tgtEl>
+                </p:cond>
+              </p:nextCondLst>
+            </p:seq>
+          </p:childTnLst>
+        </p:cTn>
+      </p:par>
+    </p:tnLst>
+  </p:timing>
 </p:sld>
 </file>
 

</xml_diff>